<commit_message>
PPP und Doku ergänzen
</commit_message>
<xml_diff>
--- a/documents/Gruppe_C_Praesentation.pptx
+++ b/documents/Gruppe_C_Praesentation.pptx
@@ -263,7 +263,7 @@
           <a:p>
             <a:fld id="{73C2F588-C8BC-4125-AE90-FCADE66807C4}" type="datetimeFigureOut">
               <a:rPr lang="de-CH" smtClean="0"/>
-              <a:t>28.05.2023</a:t>
+              <a:t>30.05.2023</a:t>
             </a:fld>
             <a:endParaRPr lang="de-CH"/>
           </a:p>
@@ -463,7 +463,7 @@
           <a:p>
             <a:fld id="{73C2F588-C8BC-4125-AE90-FCADE66807C4}" type="datetimeFigureOut">
               <a:rPr lang="de-CH" smtClean="0"/>
-              <a:t>28.05.2023</a:t>
+              <a:t>30.05.2023</a:t>
             </a:fld>
             <a:endParaRPr lang="de-CH"/>
           </a:p>
@@ -673,7 +673,7 @@
           <a:p>
             <a:fld id="{73C2F588-C8BC-4125-AE90-FCADE66807C4}" type="datetimeFigureOut">
               <a:rPr lang="de-CH" smtClean="0"/>
-              <a:t>28.05.2023</a:t>
+              <a:t>30.05.2023</a:t>
             </a:fld>
             <a:endParaRPr lang="de-CH"/>
           </a:p>
@@ -873,7 +873,7 @@
           <a:p>
             <a:fld id="{73C2F588-C8BC-4125-AE90-FCADE66807C4}" type="datetimeFigureOut">
               <a:rPr lang="de-CH" smtClean="0"/>
-              <a:t>28.05.2023</a:t>
+              <a:t>30.05.2023</a:t>
             </a:fld>
             <a:endParaRPr lang="de-CH"/>
           </a:p>
@@ -1149,7 +1149,7 @@
           <a:p>
             <a:fld id="{73C2F588-C8BC-4125-AE90-FCADE66807C4}" type="datetimeFigureOut">
               <a:rPr lang="de-CH" smtClean="0"/>
-              <a:t>28.05.2023</a:t>
+              <a:t>30.05.2023</a:t>
             </a:fld>
             <a:endParaRPr lang="de-CH"/>
           </a:p>
@@ -1417,7 +1417,7 @@
           <a:p>
             <a:fld id="{73C2F588-C8BC-4125-AE90-FCADE66807C4}" type="datetimeFigureOut">
               <a:rPr lang="de-CH" smtClean="0"/>
-              <a:t>28.05.2023</a:t>
+              <a:t>30.05.2023</a:t>
             </a:fld>
             <a:endParaRPr lang="de-CH"/>
           </a:p>
@@ -1832,7 +1832,7 @@
           <a:p>
             <a:fld id="{73C2F588-C8BC-4125-AE90-FCADE66807C4}" type="datetimeFigureOut">
               <a:rPr lang="de-CH" smtClean="0"/>
-              <a:t>28.05.2023</a:t>
+              <a:t>30.05.2023</a:t>
             </a:fld>
             <a:endParaRPr lang="de-CH"/>
           </a:p>
@@ -1974,7 +1974,7 @@
           <a:p>
             <a:fld id="{73C2F588-C8BC-4125-AE90-FCADE66807C4}" type="datetimeFigureOut">
               <a:rPr lang="de-CH" smtClean="0"/>
-              <a:t>28.05.2023</a:t>
+              <a:t>30.05.2023</a:t>
             </a:fld>
             <a:endParaRPr lang="de-CH"/>
           </a:p>
@@ -2087,7 +2087,7 @@
           <a:p>
             <a:fld id="{73C2F588-C8BC-4125-AE90-FCADE66807C4}" type="datetimeFigureOut">
               <a:rPr lang="de-CH" smtClean="0"/>
-              <a:t>28.05.2023</a:t>
+              <a:t>30.05.2023</a:t>
             </a:fld>
             <a:endParaRPr lang="de-CH"/>
           </a:p>
@@ -2400,7 +2400,7 @@
           <a:p>
             <a:fld id="{73C2F588-C8BC-4125-AE90-FCADE66807C4}" type="datetimeFigureOut">
               <a:rPr lang="de-CH" smtClean="0"/>
-              <a:t>28.05.2023</a:t>
+              <a:t>30.05.2023</a:t>
             </a:fld>
             <a:endParaRPr lang="de-CH"/>
           </a:p>
@@ -2689,7 +2689,7 @@
           <a:p>
             <a:fld id="{73C2F588-C8BC-4125-AE90-FCADE66807C4}" type="datetimeFigureOut">
               <a:rPr lang="de-CH" smtClean="0"/>
-              <a:t>28.05.2023</a:t>
+              <a:t>30.05.2023</a:t>
             </a:fld>
             <a:endParaRPr lang="de-CH"/>
           </a:p>
@@ -2932,7 +2932,7 @@
           <a:p>
             <a:fld id="{73C2F588-C8BC-4125-AE90-FCADE66807C4}" type="datetimeFigureOut">
               <a:rPr lang="de-CH" smtClean="0"/>
-              <a:t>28.05.2023</a:t>
+              <a:t>30.05.2023</a:t>
             </a:fld>
             <a:endParaRPr lang="de-CH"/>
           </a:p>
@@ -3371,10 +3371,9 @@
           <a:lstStyle/>
           <a:p>
             <a:r>
-              <a:rPr lang="de-CH" dirty="0" err="1"/>
-              <a:t>Leiterlispiel</a:t>
-            </a:r>
-            <a:endParaRPr lang="de-CH" dirty="0"/>
+              <a:rPr lang="de-CH" dirty="0"/>
+              <a:t>Leiterspiel</a:t>
+            </a:r>
           </a:p>
         </p:txBody>
       </p:sp>
@@ -3498,10 +3497,9 @@
           <a:lstStyle/>
           <a:p>
             <a:r>
-              <a:rPr lang="de-CH" dirty="0" err="1"/>
-              <a:t>Leiterlispiel</a:t>
-            </a:r>
-            <a:endParaRPr lang="de-CH" dirty="0"/>
+              <a:rPr lang="de-CH" dirty="0"/>
+              <a:t>Demo Leiterspiel</a:t>
+            </a:r>
           </a:p>
           <a:p>
             <a:r>

</xml_diff>